<commit_message>
assortment and pricing (pricing not finished)
</commit_message>
<xml_diff>
--- a/Assortment Slide Duplicate/Assortment base Oct 2024.pptx
+++ b/Assortment Slide Duplicate/Assortment base Oct 2024.pptx
@@ -13997,7 +13997,7 @@
                       <a:pPr/>
                       <a:t>[CELLRANGE]</a:t>
                     </a:fld>
-                    <a:endParaRPr lang="en-US"/>
+                    <a:endParaRPr lang="en-CH"/>
                   </a:p>
                 </c:rich>
               </c:tx>
@@ -14025,12 +14025,12 @@
                   <a:bodyPr/>
                   <a:lstStyle/>
                   <a:p>
-                    <a:fld id="{D171D991-5497-456E-971B-FD77C08B6C32}" type="CELLRANGE">
-                      <a:rPr lang="en-US"/>
+                    <a:fld id="{CED3B315-B639-401B-B1A6-07ED52C9B7F9}" type="CELLRANGE">
+                      <a:rPr lang="en-CH"/>
                       <a:pPr/>
                       <a:t>[CELLRANGE]</a:t>
                     </a:fld>
-                    <a:endParaRPr lang="en-US"/>
+                    <a:endParaRPr lang="en-CH"/>
                   </a:p>
                 </c:rich>
               </c:tx>
@@ -14059,12 +14059,12 @@
                   <a:bodyPr/>
                   <a:lstStyle/>
                   <a:p>
-                    <a:fld id="{1BA3FAE1-C03F-4283-9567-F18A5EF79F69}" type="CELLRANGE">
-                      <a:rPr lang="en-US"/>
+                    <a:fld id="{29D74274-CB64-45C5-A854-B940ACA29E92}" type="CELLRANGE">
+                      <a:rPr lang="en-CH"/>
                       <a:pPr/>
                       <a:t>[CELLRANGE]</a:t>
                     </a:fld>
-                    <a:endParaRPr lang="en-US"/>
+                    <a:endParaRPr lang="en-CH"/>
                   </a:p>
                 </c:rich>
               </c:tx>
@@ -14093,12 +14093,12 @@
                   <a:bodyPr/>
                   <a:lstStyle/>
                   <a:p>
-                    <a:fld id="{3EE7D90E-BD99-4ED4-AA06-60E1AF43362A}" type="CELLRANGE">
-                      <a:rPr lang="en-US"/>
+                    <a:fld id="{898BC659-CD91-4DCB-BC52-3EA11F5082FE}" type="CELLRANGE">
+                      <a:rPr lang="en-CH"/>
                       <a:pPr/>
                       <a:t>[CELLRANGE]</a:t>
                     </a:fld>
-                    <a:endParaRPr lang="en-US"/>
+                    <a:endParaRPr lang="en-CH"/>
                   </a:p>
                 </c:rich>
               </c:tx>
@@ -14132,7 +14132,7 @@
                       <a:pPr/>
                       <a:t>[CELLRANGE]</a:t>
                     </a:fld>
-                    <a:endParaRPr lang="en-US"/>
+                    <a:endParaRPr lang="en-CH"/>
                   </a:p>
                 </c:rich>
               </c:tx>
@@ -14165,7 +14165,7 @@
                       <a:pPr/>
                       <a:t>[CELLRANGE]</a:t>
                     </a:fld>
-                    <a:endParaRPr lang="en-US"/>
+                    <a:endParaRPr lang="en-CH"/>
                   </a:p>
                 </c:rich>
               </c:tx>
@@ -14193,12 +14193,12 @@
                   <a:bodyPr/>
                   <a:lstStyle/>
                   <a:p>
-                    <a:fld id="{B328FCC7-159E-443B-8FA4-9CA35E5D765D}" type="CELLRANGE">
-                      <a:rPr lang="en-US"/>
+                    <a:fld id="{165A264C-245D-4286-854D-F20CCDE4BABF}" type="CELLRANGE">
+                      <a:rPr lang="en-CH"/>
                       <a:pPr/>
                       <a:t>[CELLRANGE]</a:t>
                     </a:fld>
-                    <a:endParaRPr lang="en-US"/>
+                    <a:endParaRPr lang="en-CH"/>
                   </a:p>
                 </c:rich>
               </c:tx>
@@ -14227,12 +14227,12 @@
                   <a:bodyPr/>
                   <a:lstStyle/>
                   <a:p>
-                    <a:fld id="{E444A345-97D9-4FE4-B606-536AEC41C1C9}" type="CELLRANGE">
-                      <a:rPr lang="en-US"/>
+                    <a:fld id="{52AE1B2C-9895-47C4-988C-74F3B5C9D1F4}" type="CELLRANGE">
+                      <a:rPr lang="en-CH"/>
                       <a:pPr/>
                       <a:t>[CELLRANGE]</a:t>
                     </a:fld>
-                    <a:endParaRPr lang="en-US"/>
+                    <a:endParaRPr lang="en-CH"/>
                   </a:p>
                 </c:rich>
               </c:tx>
@@ -14266,7 +14266,7 @@
                       <a:pPr/>
                       <a:t>[CELLRANGE]</a:t>
                     </a:fld>
-                    <a:endParaRPr lang="en-US"/>
+                    <a:endParaRPr lang="en-CH"/>
                   </a:p>
                 </c:rich>
               </c:tx>
@@ -14299,7 +14299,7 @@
                       <a:pPr/>
                       <a:t>[CELLRANGE]</a:t>
                     </a:fld>
-                    <a:endParaRPr lang="en-US"/>
+                    <a:endParaRPr lang="en-CH"/>
                   </a:p>
                 </c:rich>
               </c:tx>
@@ -14327,12 +14327,12 @@
                   <a:bodyPr/>
                   <a:lstStyle/>
                   <a:p>
-                    <a:fld id="{5A4A0236-BB85-4A51-9218-0BED567F40C3}" type="CELLRANGE">
-                      <a:rPr lang="en-US"/>
+                    <a:fld id="{B9C5030A-C496-47DC-B012-82B447FC0F0C}" type="CELLRANGE">
+                      <a:rPr lang="en-CH"/>
                       <a:pPr/>
                       <a:t>[CELLRANGE]</a:t>
                     </a:fld>
-                    <a:endParaRPr lang="en-US"/>
+                    <a:endParaRPr lang="en-CH"/>
                   </a:p>
                 </c:rich>
               </c:tx>
@@ -14361,12 +14361,12 @@
                   <a:bodyPr/>
                   <a:lstStyle/>
                   <a:p>
-                    <a:fld id="{A52581C1-D285-4500-893A-D4F979E30284}" type="CELLRANGE">
-                      <a:rPr lang="en-US"/>
+                    <a:fld id="{74C8E7B8-401A-4FEC-89B2-F23DAEF63A80}" type="CELLRANGE">
+                      <a:rPr lang="en-CH"/>
                       <a:pPr/>
                       <a:t>[CELLRANGE]</a:t>
                     </a:fld>
-                    <a:endParaRPr lang="en-US"/>
+                    <a:endParaRPr lang="en-CH"/>
                   </a:p>
                 </c:rich>
               </c:tx>
@@ -14395,7 +14395,7 @@
                   <a:bodyPr/>
                   <a:lstStyle/>
                   <a:p>
-                    <a:endParaRPr lang="en-US"/>
+                    <a:endParaRPr lang="en-CH"/>
                   </a:p>
                 </c:rich>
               </c:tx>
@@ -14423,7 +14423,7 @@
                   <a:bodyPr/>
                   <a:lstStyle/>
                   <a:p>
-                    <a:endParaRPr lang="en-US"/>
+                    <a:endParaRPr lang="en-CH"/>
                   </a:p>
                 </c:rich>
               </c:tx>
@@ -14451,7 +14451,7 @@
                   <a:bodyPr/>
                   <a:lstStyle/>
                   <a:p>
-                    <a:endParaRPr lang="en-US"/>
+                    <a:endParaRPr lang="en-CH"/>
                   </a:p>
                 </c:rich>
               </c:tx>
@@ -14479,7 +14479,7 @@
                   <a:bodyPr/>
                   <a:lstStyle/>
                   <a:p>
-                    <a:endParaRPr lang="en-US"/>
+                    <a:endParaRPr lang="en-CH"/>
                   </a:p>
                 </c:rich>
               </c:tx>
@@ -14507,7 +14507,7 @@
                   <a:bodyPr/>
                   <a:lstStyle/>
                   <a:p>
-                    <a:endParaRPr lang="en-US"/>
+                    <a:endParaRPr lang="en-CH"/>
                   </a:p>
                 </c:rich>
               </c:tx>
@@ -14535,7 +14535,7 @@
                   <a:bodyPr/>
                   <a:lstStyle/>
                   <a:p>
-                    <a:endParaRPr lang="en-US"/>
+                    <a:endParaRPr lang="en-CH"/>
                   </a:p>
                 </c:rich>
               </c:tx>
@@ -14563,7 +14563,7 @@
                   <a:bodyPr/>
                   <a:lstStyle/>
                   <a:p>
-                    <a:endParaRPr lang="en-US"/>
+                    <a:endParaRPr lang="en-CH"/>
                   </a:p>
                 </c:rich>
               </c:tx>
@@ -14591,7 +14591,7 @@
                   <a:bodyPr/>
                   <a:lstStyle/>
                   <a:p>
-                    <a:endParaRPr lang="en-US"/>
+                    <a:endParaRPr lang="en-CH"/>
                   </a:p>
                 </c:rich>
               </c:tx>
@@ -14619,7 +14619,7 @@
                   <a:bodyPr/>
                   <a:lstStyle/>
                   <a:p>
-                    <a:endParaRPr lang="en-US"/>
+                    <a:endParaRPr lang="en-CH"/>
                   </a:p>
                 </c:rich>
               </c:tx>
@@ -14647,7 +14647,7 @@
                   <a:bodyPr/>
                   <a:lstStyle/>
                   <a:p>
-                    <a:endParaRPr lang="en-US"/>
+                    <a:endParaRPr lang="en-CH"/>
                   </a:p>
                 </c:rich>
               </c:tx>
@@ -14675,7 +14675,7 @@
                   <a:bodyPr/>
                   <a:lstStyle/>
                   <a:p>
-                    <a:endParaRPr lang="en-US"/>
+                    <a:endParaRPr lang="en-CH"/>
                   </a:p>
                 </c:rich>
               </c:tx>
@@ -14703,7 +14703,7 @@
                   <a:bodyPr/>
                   <a:lstStyle/>
                   <a:p>
-                    <a:endParaRPr lang="en-US"/>
+                    <a:endParaRPr lang="en-CH"/>
                   </a:p>
                 </c:rich>
               </c:tx>
@@ -14731,7 +14731,7 @@
                   <a:bodyPr/>
                   <a:lstStyle/>
                   <a:p>
-                    <a:endParaRPr lang="en-US"/>
+                    <a:endParaRPr lang="en-CH"/>
                   </a:p>
                 </c:rich>
               </c:tx>
@@ -14759,7 +14759,7 @@
                   <a:bodyPr/>
                   <a:lstStyle/>
                   <a:p>
-                    <a:endParaRPr lang="en-US"/>
+                    <a:endParaRPr lang="en-CH"/>
                   </a:p>
                 </c:rich>
               </c:tx>
@@ -14787,7 +14787,7 @@
                   <a:bodyPr/>
                   <a:lstStyle/>
                   <a:p>
-                    <a:endParaRPr lang="en-US"/>
+                    <a:endParaRPr lang="en-CH"/>
                   </a:p>
                 </c:rich>
               </c:tx>
@@ -14815,7 +14815,7 @@
                   <a:bodyPr/>
                   <a:lstStyle/>
                   <a:p>
-                    <a:endParaRPr lang="en-US"/>
+                    <a:endParaRPr lang="en-CH"/>
                   </a:p>
                 </c:rich>
               </c:tx>
@@ -14843,7 +14843,7 @@
                   <a:bodyPr/>
                   <a:lstStyle/>
                   <a:p>
-                    <a:endParaRPr lang="en-US"/>
+                    <a:endParaRPr lang="en-CH"/>
                   </a:p>
                 </c:rich>
               </c:tx>
@@ -14871,7 +14871,7 @@
                   <a:bodyPr/>
                   <a:lstStyle/>
                   <a:p>
-                    <a:endParaRPr lang="en-US"/>
+                    <a:endParaRPr lang="en-CH"/>
                   </a:p>
                 </c:rich>
               </c:tx>
@@ -14899,7 +14899,7 @@
                   <a:bodyPr/>
                   <a:lstStyle/>
                   <a:p>
-                    <a:endParaRPr lang="en-US"/>
+                    <a:endParaRPr lang="en-CH"/>
                   </a:p>
                 </c:rich>
               </c:tx>
@@ -14927,7 +14927,7 @@
                   <a:bodyPr/>
                   <a:lstStyle/>
                   <a:p>
-                    <a:endParaRPr lang="en-US"/>
+                    <a:endParaRPr lang="en-CH"/>
                   </a:p>
                 </c:rich>
               </c:tx>
@@ -14955,7 +14955,7 @@
                   <a:bodyPr/>
                   <a:lstStyle/>
                   <a:p>
-                    <a:endParaRPr lang="en-US"/>
+                    <a:endParaRPr lang="en-CH"/>
                   </a:p>
                 </c:rich>
               </c:tx>
@@ -14983,7 +14983,7 @@
                   <a:bodyPr/>
                   <a:lstStyle/>
                   <a:p>
-                    <a:endParaRPr lang="en-US"/>
+                    <a:endParaRPr lang="en-CH"/>
                   </a:p>
                 </c:rich>
               </c:tx>
@@ -15011,7 +15011,7 @@
                   <a:bodyPr/>
                   <a:lstStyle/>
                   <a:p>
-                    <a:endParaRPr lang="en-US"/>
+                    <a:endParaRPr lang="en-CH"/>
                   </a:p>
                 </c:rich>
               </c:tx>
@@ -15039,7 +15039,7 @@
                   <a:bodyPr/>
                   <a:lstStyle/>
                   <a:p>
-                    <a:endParaRPr lang="en-US"/>
+                    <a:endParaRPr lang="en-CH"/>
                   </a:p>
                 </c:rich>
               </c:tx>
@@ -15067,7 +15067,7 @@
                   <a:bodyPr/>
                   <a:lstStyle/>
                   <a:p>
-                    <a:endParaRPr lang="en-US"/>
+                    <a:endParaRPr lang="en-CH"/>
                   </a:p>
                 </c:rich>
               </c:tx>
@@ -15095,7 +15095,7 @@
                   <a:bodyPr/>
                   <a:lstStyle/>
                   <a:p>
-                    <a:endParaRPr lang="en-US"/>
+                    <a:endParaRPr lang="en-CH"/>
                   </a:p>
                 </c:rich>
               </c:tx>
@@ -15123,7 +15123,7 @@
                   <a:bodyPr/>
                   <a:lstStyle/>
                   <a:p>
-                    <a:endParaRPr lang="en-US"/>
+                    <a:endParaRPr lang="en-CH"/>
                   </a:p>
                 </c:rich>
               </c:tx>
@@ -15151,7 +15151,7 @@
                   <a:bodyPr/>
                   <a:lstStyle/>
                   <a:p>
-                    <a:endParaRPr lang="en-US"/>
+                    <a:endParaRPr lang="en-CH"/>
                   </a:p>
                 </c:rich>
               </c:tx>
@@ -15179,7 +15179,7 @@
                   <a:bodyPr/>
                   <a:lstStyle/>
                   <a:p>
-                    <a:endParaRPr lang="en-US"/>
+                    <a:endParaRPr lang="en-CH"/>
                   </a:p>
                 </c:rich>
               </c:tx>
@@ -15207,7 +15207,7 @@
                   <a:bodyPr/>
                   <a:lstStyle/>
                   <a:p>
-                    <a:endParaRPr lang="en-US"/>
+                    <a:endParaRPr lang="en-CH"/>
                   </a:p>
                 </c:rich>
               </c:tx>
@@ -15235,7 +15235,7 @@
                   <a:bodyPr/>
                   <a:lstStyle/>
                   <a:p>
-                    <a:endParaRPr lang="en-US"/>
+                    <a:endParaRPr lang="en-CH"/>
                   </a:p>
                 </c:rich>
               </c:tx>
@@ -15263,7 +15263,7 @@
                   <a:bodyPr/>
                   <a:lstStyle/>
                   <a:p>
-                    <a:endParaRPr lang="en-US"/>
+                    <a:endParaRPr lang="en-CH"/>
                   </a:p>
                 </c:rich>
               </c:tx>
@@ -15291,7 +15291,7 @@
                   <a:bodyPr/>
                   <a:lstStyle/>
                   <a:p>
-                    <a:endParaRPr lang="en-US"/>
+                    <a:endParaRPr lang="en-CH"/>
                   </a:p>
                 </c:rich>
               </c:tx>
@@ -15319,7 +15319,7 @@
                   <a:bodyPr/>
                   <a:lstStyle/>
                   <a:p>
-                    <a:endParaRPr lang="en-US"/>
+                    <a:endParaRPr lang="en-CH"/>
                   </a:p>
                 </c:rich>
               </c:tx>
@@ -15347,7 +15347,7 @@
                   <a:bodyPr/>
                   <a:lstStyle/>
                   <a:p>
-                    <a:endParaRPr lang="en-US"/>
+                    <a:endParaRPr lang="en-CH"/>
                   </a:p>
                 </c:rich>
               </c:tx>
@@ -15375,7 +15375,7 @@
                   <a:bodyPr/>
                   <a:lstStyle/>
                   <a:p>
-                    <a:endParaRPr lang="en-US"/>
+                    <a:endParaRPr lang="en-CH"/>
                   </a:p>
                 </c:rich>
               </c:tx>
@@ -15403,7 +15403,7 @@
                   <a:bodyPr/>
                   <a:lstStyle/>
                   <a:p>
-                    <a:endParaRPr lang="en-US"/>
+                    <a:endParaRPr lang="en-CH"/>
                   </a:p>
                 </c:rich>
               </c:tx>
@@ -15778,6 +15778,7 @@
     </c:plotArea>
     <c:plotVisOnly val="1"/>
     <c:dispBlanksAs val="gap"/>
+    <c:showDLblsOverMax val="0"/>
     <c:extLst>
       <c:ext xmlns:c16r3="http://schemas.microsoft.com/office/drawing/2017/03/chart" uri="{56B9EC1D-385E-4148-901F-78D8002777C0}">
         <c16r3:dataDisplayOptions16>
@@ -15785,7 +15786,6 @@
         </c16r3:dataDisplayOptions16>
       </c:ext>
     </c:extLst>
-    <c:showDLblsOverMax val="0"/>
   </c:chart>
   <c:spPr>
     <a:noFill/>
@@ -15981,14 +15981,14 @@
                     <a:pPr>
                       <a:defRPr/>
                     </a:pPr>
-                    <a:fld id="{EEFF85B0-FA76-48F5-A3A3-DBD04766FFF8}" type="CELLRANGE">
+                    <a:fld id="{143EE2A9-4067-47D9-9269-87B324ED1007}" type="CELLRANGE">
                       <a:rPr lang="en-US"/>
                       <a:pPr>
                         <a:defRPr/>
                       </a:pPr>
                       <a:t>[CELLRANGE]</a:t>
                     </a:fld>
-                    <a:endParaRPr lang="en-US"/>
+                    <a:endParaRPr lang="en-CH"/>
                   </a:p>
                 </c:rich>
               </c:tx>
@@ -16032,14 +16032,14 @@
                     <a:pPr>
                       <a:defRPr/>
                     </a:pPr>
-                    <a:fld id="{D6F0A4A3-857A-49AB-B51C-2BA036FFAB5A}" type="CELLRANGE">
+                    <a:fld id="{E91BB796-57D2-4482-90CE-246EB367D2B4}" type="CELLRANGE">
                       <a:rPr lang="en-US"/>
                       <a:pPr>
                         <a:defRPr/>
                       </a:pPr>
                       <a:t>[CELLRANGE]</a:t>
                     </a:fld>
-                    <a:endParaRPr lang="en-US"/>
+                    <a:endParaRPr lang="en-CH"/>
                   </a:p>
                 </c:rich>
               </c:tx>
@@ -16083,14 +16083,14 @@
                     <a:pPr>
                       <a:defRPr/>
                     </a:pPr>
-                    <a:fld id="{0646F00B-B0E4-46E6-95F3-C3206180345E}" type="CELLRANGE">
+                    <a:fld id="{9335F4AD-FBC8-45B7-9C49-BDC625899973}" type="CELLRANGE">
                       <a:rPr lang="en-US"/>
                       <a:pPr>
                         <a:defRPr/>
                       </a:pPr>
                       <a:t>[CELLRANGE]</a:t>
                     </a:fld>
-                    <a:endParaRPr lang="en-US"/>
+                    <a:endParaRPr lang="en-CH"/>
                   </a:p>
                 </c:rich>
               </c:tx>
@@ -16134,14 +16134,14 @@
                     <a:pPr>
                       <a:defRPr/>
                     </a:pPr>
-                    <a:fld id="{488070AC-6245-448F-98AF-D460DBE4559C}" type="CELLRANGE">
+                    <a:fld id="{1B45546F-2A03-4A84-A088-CA52B0CFCC24}" type="CELLRANGE">
                       <a:rPr lang="en-US"/>
                       <a:pPr>
                         <a:defRPr/>
                       </a:pPr>
                       <a:t>[CELLRANGE]</a:t>
                     </a:fld>
-                    <a:endParaRPr lang="en-US"/>
+                    <a:endParaRPr lang="en-CH"/>
                   </a:p>
                 </c:rich>
               </c:tx>
@@ -16182,12 +16182,12 @@
                   <a:bodyPr/>
                   <a:lstStyle/>
                   <a:p>
-                    <a:fld id="{2357BBC3-9A90-4FCD-91C2-ADBF71907DC2}" type="CELLRANGE">
+                    <a:fld id="{83CC3B94-880B-4DA3-B40F-2973CB183268}" type="CELLRANGE">
                       <a:rPr lang="en-US"/>
                       <a:pPr/>
                       <a:t>[CELLRANGE]</a:t>
                     </a:fld>
-                    <a:endParaRPr lang="en-US"/>
+                    <a:endParaRPr lang="en-CH"/>
                   </a:p>
                 </c:rich>
               </c:tx>
@@ -16224,14 +16224,14 @@
                     <a:pPr>
                       <a:defRPr/>
                     </a:pPr>
-                    <a:fld id="{08D97715-638D-4FA9-B4DD-B3090DAD0197}" type="CELLRANGE">
+                    <a:fld id="{80E6DAA1-7D5C-463C-8F16-0AF4FBDD6B7A}" type="CELLRANGE">
                       <a:rPr lang="en-US"/>
                       <a:pPr>
                         <a:defRPr/>
                       </a:pPr>
                       <a:t>[CELLRANGE]</a:t>
                     </a:fld>
-                    <a:endParaRPr lang="en-US"/>
+                    <a:endParaRPr lang="en-CH"/>
                   </a:p>
                 </c:rich>
               </c:tx>
@@ -16275,14 +16275,14 @@
                     <a:pPr>
                       <a:defRPr/>
                     </a:pPr>
-                    <a:fld id="{CC9AA53C-9BB1-4BF6-8733-5B891E18C7F1}" type="CELLRANGE">
+                    <a:fld id="{5B241715-2B9D-478F-BA0F-6AF8D7E49195}" type="CELLRANGE">
                       <a:rPr lang="en-US"/>
                       <a:pPr>
                         <a:defRPr/>
                       </a:pPr>
                       <a:t>[CELLRANGE]</a:t>
                     </a:fld>
-                    <a:endParaRPr lang="en-US"/>
+                    <a:endParaRPr lang="en-CH"/>
                   </a:p>
                 </c:rich>
               </c:tx>
@@ -16332,7 +16332,7 @@
                       <a:pPr/>
                       <a:t>[CELLRANGE]</a:t>
                     </a:fld>
-                    <a:endParaRPr lang="en-US"/>
+                    <a:endParaRPr lang="en-CH"/>
                   </a:p>
                 </c:rich>
               </c:tx>
@@ -16363,14 +16363,14 @@
                     <a:pPr>
                       <a:defRPr/>
                     </a:pPr>
-                    <a:fld id="{971C24D6-B7E1-4AE9-B581-200552493E79}" type="CELLRANGE">
+                    <a:fld id="{ED16F6CA-A355-46FA-8F8E-F54AE6CB2E28}" type="CELLRANGE">
                       <a:rPr lang="en-US"/>
                       <a:pPr>
                         <a:defRPr/>
                       </a:pPr>
                       <a:t>[CELLRANGE]</a:t>
                     </a:fld>
-                    <a:endParaRPr lang="en-US"/>
+                    <a:endParaRPr lang="en-CH"/>
                   </a:p>
                 </c:rich>
               </c:tx>
@@ -16414,14 +16414,14 @@
                     <a:pPr>
                       <a:defRPr/>
                     </a:pPr>
-                    <a:fld id="{99989F06-C94A-463B-A3AE-DF4BD61FBC90}" type="CELLRANGE">
+                    <a:fld id="{DFAE0EFC-FA1A-465D-B148-5034DA836535}" type="CELLRANGE">
                       <a:rPr lang="en-US"/>
                       <a:pPr>
                         <a:defRPr/>
                       </a:pPr>
                       <a:t>[CELLRANGE]</a:t>
                     </a:fld>
-                    <a:endParaRPr lang="en-US"/>
+                    <a:endParaRPr lang="en-CH"/>
                   </a:p>
                 </c:rich>
               </c:tx>
@@ -16471,7 +16471,7 @@
                       <a:pPr/>
                       <a:t>[CELLRANGE]</a:t>
                     </a:fld>
-                    <a:endParaRPr lang="en-US"/>
+                    <a:endParaRPr lang="en-CH"/>
                   </a:p>
                 </c:rich>
               </c:tx>
@@ -16508,14 +16508,14 @@
                     <a:pPr>
                       <a:defRPr/>
                     </a:pPr>
-                    <a:fld id="{1DEDE330-24E0-45F5-B600-A13D077079EF}" type="CELLRANGE">
+                    <a:fld id="{BE4598E7-964E-40CA-B077-204483775372}" type="CELLRANGE">
                       <a:rPr lang="en-US"/>
                       <a:pPr>
                         <a:defRPr/>
                       </a:pPr>
                       <a:t>[CELLRANGE]</a:t>
                     </a:fld>
-                    <a:endParaRPr lang="en-US"/>
+                    <a:endParaRPr lang="en-CH"/>
                   </a:p>
                 </c:rich>
               </c:tx>
@@ -16561,7 +16561,7 @@
                       <a:pPr/>
                       <a:t>[CELLRANGE]</a:t>
                     </a:fld>
-                    <a:endParaRPr lang="en-US"/>
+                    <a:endParaRPr lang="en-CH"/>
                   </a:p>
                 </c:rich>
               </c:tx>
@@ -16594,7 +16594,7 @@
                       <a:pPr/>
                       <a:t>[CELLRANGE]</a:t>
                     </a:fld>
-                    <a:endParaRPr lang="en-US"/>
+                    <a:endParaRPr lang="en-CH"/>
                   </a:p>
                 </c:rich>
               </c:tx>
@@ -16627,7 +16627,7 @@
                       <a:pPr/>
                       <a:t>[CELLRANGE]</a:t>
                     </a:fld>
-                    <a:endParaRPr lang="en-US"/>
+                    <a:endParaRPr lang="en-CH"/>
                   </a:p>
                 </c:rich>
               </c:tx>
@@ -16665,7 +16665,7 @@
                       </a:pPr>
                       <a:t>[CELLRANGE]</a:t>
                     </a:fld>
-                    <a:endParaRPr lang="en-US"/>
+                    <a:endParaRPr lang="en-CH"/>
                   </a:p>
                 </c:rich>
               </c:tx>
@@ -16716,7 +16716,7 @@
                       </a:pPr>
                       <a:t>[CELLRANGE]</a:t>
                     </a:fld>
-                    <a:endParaRPr lang="en-US"/>
+                    <a:endParaRPr lang="en-CH"/>
                   </a:p>
                 </c:rich>
               </c:tx>
@@ -16767,7 +16767,7 @@
                       </a:pPr>
                       <a:t>[CELLRANGE]</a:t>
                     </a:fld>
-                    <a:endParaRPr lang="en-US"/>
+                    <a:endParaRPr lang="en-CH"/>
                   </a:p>
                 </c:rich>
               </c:tx>
@@ -16818,7 +16818,7 @@
                       </a:pPr>
                       <a:t>[CELLRANGE]</a:t>
                     </a:fld>
-                    <a:endParaRPr lang="en-US"/>
+                    <a:endParaRPr lang="en-CH"/>
                   </a:p>
                 </c:rich>
               </c:tx>
@@ -16869,7 +16869,7 @@
                       </a:pPr>
                       <a:t>[CELLRANGE]</a:t>
                     </a:fld>
-                    <a:endParaRPr lang="en-US"/>
+                    <a:endParaRPr lang="en-CH"/>
                   </a:p>
                 </c:rich>
               </c:tx>
@@ -17269,6 +17269,7 @@
     </c:plotArea>
     <c:plotVisOnly val="1"/>
     <c:dispBlanksAs val="gap"/>
+    <c:showDLblsOverMax val="0"/>
     <c:extLst>
       <c:ext xmlns:c16r3="http://schemas.microsoft.com/office/drawing/2017/03/chart" uri="{56B9EC1D-385E-4148-901F-78D8002777C0}">
         <c16r3:dataDisplayOptions16>
@@ -17276,7 +17277,6 @@
         </c16r3:dataDisplayOptions16>
       </c:ext>
     </c:extLst>
-    <c:showDLblsOverMax val="0"/>
   </c:chart>
   <c:spPr>
     <a:noFill/>
@@ -17383,7 +17383,7 @@
           <a:p>
             <a:fld id="{C5679D80-3FD9-4F8D-8F9D-355EB3FC5F56}" type="datetimeFigureOut">
               <a:rPr lang="en-CH" smtClean="0"/>
-              <a:t>07/27/2025</a:t>
+              <a:t>27/08/2025</a:t>
             </a:fld>
             <a:endParaRPr lang="en-CH"/>
           </a:p>
@@ -21393,7 +21393,7 @@
           <a:p>
             <a:fld id="{DBBFC13E-3F64-4E36-814E-4A390258C12B}" type="datetime1">
               <a:rPr lang="en-US" smtClean="0"/>
-              <a:t>7/27/2025</a:t>
+              <a:t>8/27/2025</a:t>
             </a:fld>
             <a:endParaRPr lang="en-US"/>
           </a:p>
@@ -21774,7 +21774,7 @@
           <a:p>
             <a:fld id="{D50F348D-8052-4CFF-A59A-38700A83BEA1}" type="datetime1">
               <a:rPr lang="en-US" smtClean="0"/>
-              <a:t>7/27/2025</a:t>
+              <a:t>8/27/2025</a:t>
             </a:fld>
             <a:endParaRPr lang="en-US"/>
           </a:p>
@@ -22216,7 +22216,7 @@
           <a:p>
             <a:fld id="{80ACA9F3-09D5-4DB9-A036-5BB8C1DA1B12}" type="datetime1">
               <a:rPr lang="en-US" smtClean="0"/>
-              <a:t>7/27/2025</a:t>
+              <a:t>8/27/2025</a:t>
             </a:fld>
             <a:endParaRPr lang="en-US"/>
           </a:p>
@@ -22712,7 +22712,7 @@
           <a:p>
             <a:fld id="{A1577D70-F57E-432D-B3D5-0759FA0A3343}" type="datetime1">
               <a:rPr lang="en-US" smtClean="0"/>
-              <a:t>7/27/2025</a:t>
+              <a:t>8/27/2025</a:t>
             </a:fld>
             <a:endParaRPr lang="en-US"/>
           </a:p>
@@ -23133,7 +23133,7 @@
           <a:p>
             <a:fld id="{84E78701-F38D-4E5C-ABBC-833AA43BD5FA}" type="datetime1">
               <a:rPr lang="en-US" smtClean="0"/>
-              <a:t>7/27/2025</a:t>
+              <a:t>8/27/2025</a:t>
             </a:fld>
             <a:endParaRPr lang="en-US"/>
           </a:p>
@@ -23859,7 +23859,7 @@
           <a:p>
             <a:fld id="{14C6B110-5A78-424A-9D1E-371817D87CD3}" type="datetime1">
               <a:rPr lang="en-US" smtClean="0"/>
-              <a:t>7/27/2025</a:t>
+              <a:t>8/27/2025</a:t>
             </a:fld>
             <a:endParaRPr lang="en-US"/>
           </a:p>
@@ -24519,7 +24519,7 @@
           <a:p>
             <a:fld id="{352CCA97-18F7-420E-AA09-369E2E7F8144}" type="datetime1">
               <a:rPr lang="en-US" smtClean="0"/>
-              <a:t>7/27/2025</a:t>
+              <a:t>8/27/2025</a:t>
             </a:fld>
             <a:endParaRPr lang="en-US"/>
           </a:p>
@@ -25061,7 +25061,7 @@
           <a:p>
             <a:fld id="{7A197316-5A91-47EC-86A0-A3A842E46FD3}" type="datetime1">
               <a:rPr lang="en-US" smtClean="0"/>
-              <a:t>7/27/2025</a:t>
+              <a:t>8/27/2025</a:t>
             </a:fld>
             <a:endParaRPr lang="en-US"/>
           </a:p>
@@ -25537,7 +25537,7 @@
           <a:p>
             <a:fld id="{71E1AB04-F9EF-4B2B-85D6-244B8E45D3EA}" type="datetime1">
               <a:rPr lang="en-US" smtClean="0"/>
-              <a:t>7/27/2025</a:t>
+              <a:t>8/27/2025</a:t>
             </a:fld>
             <a:endParaRPr lang="en-US"/>
           </a:p>
@@ -25747,7 +25747,7 @@
           <a:p>
             <a:fld id="{7996436F-1613-4BD9-8DA2-0B828AB65D9D}" type="datetime1">
               <a:rPr lang="en-US" smtClean="0"/>
-              <a:t>7/27/2025</a:t>
+              <a:t>8/27/2025</a:t>
             </a:fld>
             <a:endParaRPr lang="en-AE"/>
           </a:p>
@@ -26158,7 +26158,7 @@
           <a:p>
             <a:fld id="{F9F4D88D-6F95-4734-9E93-59E96F4C5B2D}" type="datetime1">
               <a:rPr lang="en-US" smtClean="0"/>
-              <a:t>7/27/2025</a:t>
+              <a:t>8/27/2025</a:t>
             </a:fld>
             <a:endParaRPr lang="en-US"/>
           </a:p>
@@ -26364,7 +26364,7 @@
           <a:p>
             <a:fld id="{4B539E5B-D660-4908-A930-5D7ED25D7968}" type="datetime1">
               <a:rPr lang="en-US" smtClean="0"/>
-              <a:t>7/27/2025</a:t>
+              <a:t>8/27/2025</a:t>
             </a:fld>
             <a:endParaRPr lang="en-AE"/>
           </a:p>
@@ -26829,7 +26829,7 @@
           <a:p>
             <a:fld id="{E87FDB52-BBB2-437C-B730-0F4FD1CC342B}" type="datetime1">
               <a:rPr lang="en-US" smtClean="0"/>
-              <a:t>7/27/2025</a:t>
+              <a:t>8/27/2025</a:t>
             </a:fld>
             <a:endParaRPr lang="en-AE"/>
           </a:p>
@@ -27066,7 +27066,7 @@
           <a:p>
             <a:fld id="{32E4E91C-ACCB-4FB2-9CE2-8479C989DF49}" type="datetime1">
               <a:rPr lang="en-US" smtClean="0"/>
-              <a:t>7/27/2025</a:t>
+              <a:t>8/27/2025</a:t>
             </a:fld>
             <a:endParaRPr lang="en-AE"/>
           </a:p>
@@ -27821,7 +27821,7 @@
           <a:p>
             <a:fld id="{3FC227B7-6CE2-494E-9FF0-D5486E326F93}" type="datetime1">
               <a:rPr lang="en-US" smtClean="0"/>
-              <a:t>7/27/2025</a:t>
+              <a:t>8/27/2025</a:t>
             </a:fld>
             <a:endParaRPr lang="en-US"/>
           </a:p>
@@ -28950,7 +28950,7 @@
           <a:p>
             <a:fld id="{9BA698F9-E0CC-4675-A2A3-920539354D2A}" type="datetime1">
               <a:rPr lang="en-US" smtClean="0"/>
-              <a:t>7/27/2025</a:t>
+              <a:t>8/27/2025</a:t>
             </a:fld>
             <a:endParaRPr lang="en-US"/>
           </a:p>
@@ -29150,7 +29150,7 @@
           <a:p>
             <a:fld id="{FFB77DA4-E66A-483D-9837-A2011CF448D8}" type="datetime1">
               <a:rPr lang="en-US" smtClean="0"/>
-              <a:t>7/27/2025</a:t>
+              <a:t>8/27/2025</a:t>
             </a:fld>
             <a:endParaRPr lang="en-US"/>
           </a:p>
@@ -29394,7 +29394,7 @@
           <a:p>
             <a:fld id="{D2DFC3E4-C284-436E-93E6-279BCC9ECA79}" type="datetime1">
               <a:rPr lang="en-US" smtClean="0"/>
-              <a:t>7/27/2025</a:t>
+              <a:t>8/27/2025</a:t>
             </a:fld>
             <a:endParaRPr lang="en-US"/>
           </a:p>
@@ -29704,7 +29704,7 @@
           <a:p>
             <a:fld id="{88775FBB-4E36-4540-99EF-CA50C933F081}" type="datetime1">
               <a:rPr lang="en-US" smtClean="0"/>
-              <a:t>7/27/2025</a:t>
+              <a:t>8/27/2025</a:t>
             </a:fld>
             <a:endParaRPr lang="en-US"/>
           </a:p>
@@ -30009,7 +30009,7 @@
           <a:p>
             <a:fld id="{98C7047C-F6FF-45B2-9077-DC747EBFC0B4}" type="datetime1">
               <a:rPr lang="en-US" smtClean="0"/>
-              <a:t>7/27/2025</a:t>
+              <a:t>8/27/2025</a:t>
             </a:fld>
             <a:endParaRPr lang="en-US"/>
           </a:p>
@@ -30571,7 +30571,7 @@
           <a:p>
             <a:fld id="{67EBB61B-CA5F-4D3B-A745-33BC47F4D24F}" type="datetime1">
               <a:rPr lang="en-US" smtClean="0"/>
-              <a:t>7/27/2025</a:t>
+              <a:t>8/27/2025</a:t>
             </a:fld>
             <a:endParaRPr lang="en-US"/>
           </a:p>
@@ -30816,7 +30816,7 @@
           <a:p>
             <a:fld id="{EEBC32BF-A67C-4A09-93F2-0403FF7C946C}" type="datetime1">
               <a:rPr lang="en-US" smtClean="0"/>
-              <a:t>7/27/2025</a:t>
+              <a:t>8/27/2025</a:t>
             </a:fld>
             <a:endParaRPr lang="en-US"/>
           </a:p>
@@ -36070,7 +36070,7 @@
           <a:p>
             <a:fld id="{AE4C06A1-875F-4586-BE13-F337DE5DF152}" type="datetime1">
               <a:rPr lang="en-US" smtClean="0"/>
-              <a:t>7/27/2025</a:t>
+              <a:t>8/27/2025</a:t>
             </a:fld>
             <a:endParaRPr lang="en-US"/>
           </a:p>
@@ -36563,7 +36563,7 @@
             <a:pPr lvl="0"/>
             <a:fld id="{5D30810A-8818-4906-96FE-AE4519FE4987}" type="datetime1">
               <a:rPr lang="en-US" noProof="0" smtClean="0"/>
-              <a:t>7/27/2025</a:t>
+              <a:t>8/27/2025</a:t>
             </a:fld>
             <a:endParaRPr lang="en-US" noProof="0"/>
           </a:p>
@@ -36900,7 +36900,7 @@
             <a:pPr lvl="0"/>
             <a:fld id="{AD35CDD8-99F1-4CE5-9168-9A47BF036AAB}" type="datetime1">
               <a:rPr lang="en-US" noProof="0" smtClean="0"/>
-              <a:t>7/27/2025</a:t>
+              <a:t>8/27/2025</a:t>
             </a:fld>
             <a:endParaRPr lang="en-US" noProof="0"/>
           </a:p>
@@ -37735,7 +37735,7 @@
             <a:pPr lvl="0"/>
             <a:fld id="{E8894C2E-3B7B-4D85-92BD-2477422B964B}" type="datetime1">
               <a:rPr lang="en-US" noProof="0" smtClean="0"/>
-              <a:t>7/27/2025</a:t>
+              <a:t>8/27/2025</a:t>
             </a:fld>
             <a:endParaRPr lang="en-US" noProof="0"/>
           </a:p>
@@ -38155,7 +38155,7 @@
             <a:pPr lvl="0"/>
             <a:fld id="{EFB81D27-C5BB-4DC7-A4E3-42EA1CA880C6}" type="datetime1">
               <a:rPr lang="en-US" noProof="0" smtClean="0"/>
-              <a:t>7/27/2025</a:t>
+              <a:t>8/27/2025</a:t>
             </a:fld>
             <a:endParaRPr lang="en-US" noProof="0"/>
           </a:p>
@@ -38252,7 +38252,7 @@
           <a:lstStyle/>
           <a:p>
             <a:r>
-              <a:rPr lang="en-US"/>
+              <a:rPr lang="en-US" dirty="0"/>
               <a:t>Cumulative Product Share | Category | Brand | National | P12M</a:t>
             </a:r>
           </a:p>
@@ -38285,12 +38285,20 @@
           <a:lstStyle/>
           <a:p>
             <a:r>
+              <a:rPr lang="en-US" dirty="0" err="1">
+                <a:highlight>
+                  <a:srgbClr val="FFFF00"/>
+                </a:highlight>
+              </a:rPr>
+              <a:t>Manuf</a:t>
+            </a:r>
+            <a:r>
               <a:rPr lang="en-US" dirty="0">
                 <a:highlight>
                   <a:srgbClr val="FFFF00"/>
                 </a:highlight>
               </a:rPr>
-              <a:t>Brand Cumulative Product Share </a:t>
+              <a:t> Cumulative Product Share </a:t>
             </a:r>
             <a:r>
               <a:rPr lang="en-GB" dirty="0">
@@ -38581,7 +38589,7 @@
             <a:pPr lvl="0"/>
             <a:fld id="{F168323C-C05C-44B1-8BC1-8ABB3B333986}" type="datetime1">
               <a:rPr lang="en-US" noProof="0" smtClean="0"/>
-              <a:t>7/27/2025</a:t>
+              <a:t>8/27/2025</a:t>
             </a:fld>
             <a:endParaRPr lang="en-US" noProof="0"/>
           </a:p>
@@ -45889,7 +45897,7 @@
             <a:pPr lvl="0"/>
             <a:fld id="{81FA3276-D408-4D96-BFE5-3896868C60AF}" type="datetime1">
               <a:rPr lang="en-US" noProof="0" smtClean="0"/>
-              <a:t>7/27/2025</a:t>
+              <a:t>8/27/2025</a:t>
             </a:fld>
             <a:endParaRPr lang="en-US" noProof="0"/>
           </a:p>
@@ -46339,7 +46347,7 @@
             <a:pPr lvl="0"/>
             <a:fld id="{55ADB6A1-CC90-41DB-9773-C9DAAD5A90C7}" type="datetime1">
               <a:rPr lang="en-US" noProof="0" smtClean="0"/>
-              <a:t>7/27/2025</a:t>
+              <a:t>8/27/2025</a:t>
             </a:fld>
             <a:endParaRPr lang="en-US" noProof="0"/>
           </a:p>
@@ -46800,7 +46808,7 @@
             <a:pPr lvl="0"/>
             <a:fld id="{B9917B00-4452-49F2-B119-DA5C8EC54206}" type="datetime1">
               <a:rPr lang="en-US" noProof="0" smtClean="0"/>
-              <a:t>7/27/2025</a:t>
+              <a:t>8/27/2025</a:t>
             </a:fld>
             <a:endParaRPr lang="en-US" noProof="0"/>
           </a:p>
@@ -50714,12 +50722,14 @@
 </file>
 
 <file path=customXml/item1.xml><?xml version="1.0" encoding="utf-8"?>
-<?mso-contentType ?>
-<FormTemplates xmlns="http://schemas.microsoft.com/sharepoint/v3/contenttype/forms">
-  <Display>DocumentLibraryForm</Display>
-  <Edit>DocumentLibraryForm</Edit>
-  <New>DocumentLibraryForm</New>
-</FormTemplates>
+<p:properties xmlns:p="http://schemas.microsoft.com/office/2006/metadata/properties" xmlns:xsi="http://www.w3.org/2001/XMLSchema-instance" xmlns:pc="http://schemas.microsoft.com/office/infopath/2007/PartnerControls">
+  <documentManagement>
+    <lcf76f155ced4ddcb4097134ff3c332f xmlns="0ad93b7f-b0cd-4c46-aaaf-ff14495948cf">
+      <Terms xmlns="http://schemas.microsoft.com/office/infopath/2007/PartnerControls"/>
+    </lcf76f155ced4ddcb4097134ff3c332f>
+    <TaxCatchAll xmlns="474cf4e4-8a51-432b-9e1b-0ea607ac38ff"/>
+  </documentManagement>
+</p:properties>
 </file>
 
 <file path=customXml/item2.xml><?xml version="1.0" encoding="utf-8"?>
@@ -50966,20 +50976,27 @@
 </file>
 
 <file path=customXml/item3.xml><?xml version="1.0" encoding="utf-8"?>
-<p:properties xmlns:p="http://schemas.microsoft.com/office/2006/metadata/properties" xmlns:xsi="http://www.w3.org/2001/XMLSchema-instance" xmlns:pc="http://schemas.microsoft.com/office/infopath/2007/PartnerControls">
-  <documentManagement>
-    <lcf76f155ced4ddcb4097134ff3c332f xmlns="0ad93b7f-b0cd-4c46-aaaf-ff14495948cf">
-      <Terms xmlns="http://schemas.microsoft.com/office/infopath/2007/PartnerControls"/>
-    </lcf76f155ced4ddcb4097134ff3c332f>
-    <TaxCatchAll xmlns="474cf4e4-8a51-432b-9e1b-0ea607ac38ff"/>
-  </documentManagement>
-</p:properties>
+<?mso-contentType ?>
+<FormTemplates xmlns="http://schemas.microsoft.com/sharepoint/v3/contenttype/forms">
+  <Display>DocumentLibraryForm</Display>
+  <Edit>DocumentLibraryForm</Edit>
+  <New>DocumentLibraryForm</New>
+</FormTemplates>
 </file>
 
 <file path=customXml/itemProps1.xml><?xml version="1.0" encoding="utf-8"?>
-<ds:datastoreItem xmlns:ds="http://schemas.openxmlformats.org/officeDocument/2006/customXml" ds:itemID="{7569004E-13CB-4752-B39D-2BEF8CE13196}">
+<ds:datastoreItem xmlns:ds="http://schemas.openxmlformats.org/officeDocument/2006/customXml" ds:itemID="{5D3B97F3-A04F-4F0C-B39A-C5495F1A7B05}">
   <ds:schemaRefs>
-    <ds:schemaRef ds:uri="http://schemas.microsoft.com/sharepoint/v3/contenttype/forms"/>
+    <ds:schemaRef ds:uri="http://schemas.microsoft.com/office/2006/documentManagement/types"/>
+    <ds:schemaRef ds:uri="0ad93b7f-b0cd-4c46-aaaf-ff14495948cf"/>
+    <ds:schemaRef ds:uri="http://purl.org/dc/elements/1.1/"/>
+    <ds:schemaRef ds:uri="http://www.w3.org/XML/1998/namespace"/>
+    <ds:schemaRef ds:uri="http://schemas.microsoft.com/office/2006/metadata/properties"/>
+    <ds:schemaRef ds:uri="474cf4e4-8a51-432b-9e1b-0ea607ac38ff"/>
+    <ds:schemaRef ds:uri="http://schemas.microsoft.com/office/infopath/2007/PartnerControls"/>
+    <ds:schemaRef ds:uri="http://schemas.openxmlformats.org/package/2006/metadata/core-properties"/>
+    <ds:schemaRef ds:uri="http://purl.org/dc/dcmitype/"/>
+    <ds:schemaRef ds:uri="http://purl.org/dc/terms/"/>
   </ds:schemaRefs>
 </ds:datastoreItem>
 </file>
@@ -51004,18 +51021,9 @@
 </file>
 
 <file path=customXml/itemProps3.xml><?xml version="1.0" encoding="utf-8"?>
-<ds:datastoreItem xmlns:ds="http://schemas.openxmlformats.org/officeDocument/2006/customXml" ds:itemID="{5D3B97F3-A04F-4F0C-B39A-C5495F1A7B05}">
+<ds:datastoreItem xmlns:ds="http://schemas.openxmlformats.org/officeDocument/2006/customXml" ds:itemID="{7569004E-13CB-4752-B39D-2BEF8CE13196}">
   <ds:schemaRefs>
-    <ds:schemaRef ds:uri="http://schemas.microsoft.com/office/2006/documentManagement/types"/>
-    <ds:schemaRef ds:uri="0ad93b7f-b0cd-4c46-aaaf-ff14495948cf"/>
-    <ds:schemaRef ds:uri="http://purl.org/dc/elements/1.1/"/>
-    <ds:schemaRef ds:uri="http://www.w3.org/XML/1998/namespace"/>
-    <ds:schemaRef ds:uri="http://schemas.microsoft.com/office/2006/metadata/properties"/>
-    <ds:schemaRef ds:uri="474cf4e4-8a51-432b-9e1b-0ea607ac38ff"/>
-    <ds:schemaRef ds:uri="http://schemas.microsoft.com/office/infopath/2007/PartnerControls"/>
-    <ds:schemaRef ds:uri="http://schemas.openxmlformats.org/package/2006/metadata/core-properties"/>
-    <ds:schemaRef ds:uri="http://purl.org/dc/dcmitype/"/>
-    <ds:schemaRef ds:uri="http://purl.org/dc/terms/"/>
+    <ds:schemaRef ds:uri="http://schemas.microsoft.com/sharepoint/v3/contenttype/forms"/>
   </ds:schemaRefs>
 </ds:datastoreItem>
 </file>
</xml_diff>